<commit_message>
added case 04 teaching note
</commit_message>
<xml_diff>
--- a/activities/week04_characteristics_summary.pptx
+++ b/activities/week04_characteristics_summary.pptx
@@ -6,6 +6,7 @@
   </p:sldMasterIdLst>
   <p:sldIdLst>
     <p:sldId id="256" r:id="rId2"/>
+    <p:sldId id="257" r:id="rId3"/>
   </p:sldIdLst>
   <p:sldSz cx="12192000" cy="6858000"/>
   <p:notesSz cx="6858000" cy="9144000"/>
@@ -104,13 +105,18 @@
       </a:defRPr>
     </a:lvl9pPr>
   </p:defaultTextStyle>
+  <p:extLst>
+    <p:ext uri="{EFAFB233-063F-42B5-8137-9DF3F51BA10A}">
+      <p15:sldGuideLst xmlns:p15="http://schemas.microsoft.com/office/powerpoint/2012/main"/>
+    </p:ext>
+  </p:extLst>
 </p:presentation>
 </file>
 
 <file path=ppt/revisionInfo.xml><?xml version="1.0" encoding="utf-8"?>
 <p1510:revInfo xmlns:a="http://schemas.openxmlformats.org/drawingml/2006/main" xmlns:r="http://schemas.openxmlformats.org/officeDocument/2006/relationships" xmlns:p1510="http://schemas.microsoft.com/office/powerpoint/2015/10/main">
   <p1510:revLst>
-    <p1510:client id="{A9577445-ED6B-43E6-8E8C-612193906B57}" v="1" dt="2025-09-10T23:46:02.965"/>
+    <p1510:client id="{A9577445-ED6B-43E6-8E8C-612193906B57}" v="3" dt="2025-09-15T22:14:35.763"/>
   </p1510:revLst>
 </p1510:revInfo>
 </file>
@@ -119,25 +125,48 @@
 <pc:chgInfo xmlns:a="http://schemas.openxmlformats.org/drawingml/2006/main" xmlns:r="http://schemas.openxmlformats.org/officeDocument/2006/relationships" xmlns:ac="http://schemas.microsoft.com/office/drawing/2013/main/command" xmlns:pc="http://schemas.microsoft.com/office/powerpoint/2013/main/command">
   <pc:docChgLst>
     <pc:chgData name="Chenarides,Lauren" userId="adbf3f91-28ff-415d-924b-37ef86f41ea6" providerId="ADAL" clId="{A9577445-ED6B-43E6-8E8C-612193906B57}"/>
-    <pc:docChg chg="modSld">
-      <pc:chgData name="Chenarides,Lauren" userId="adbf3f91-28ff-415d-924b-37ef86f41ea6" providerId="ADAL" clId="{A9577445-ED6B-43E6-8E8C-612193906B57}" dt="2025-09-10T23:47:16.202" v="61" actId="1582"/>
+    <pc:docChg chg="undo custSel addSld modSld">
+      <pc:chgData name="Chenarides,Lauren" userId="adbf3f91-28ff-415d-924b-37ef86f41ea6" providerId="ADAL" clId="{A9577445-ED6B-43E6-8E8C-612193906B57}" dt="2025-09-15T22:14:35.763" v="232"/>
       <pc:docMkLst>
         <pc:docMk/>
       </pc:docMkLst>
       <pc:sldChg chg="modSp mod">
-        <pc:chgData name="Chenarides,Lauren" userId="adbf3f91-28ff-415d-924b-37ef86f41ea6" providerId="ADAL" clId="{A9577445-ED6B-43E6-8E8C-612193906B57}" dt="2025-09-10T23:47:16.202" v="61" actId="1582"/>
+        <pc:chgData name="Chenarides,Lauren" userId="adbf3f91-28ff-415d-924b-37ef86f41ea6" providerId="ADAL" clId="{A9577445-ED6B-43E6-8E8C-612193906B57}" dt="2025-09-15T22:13:17.771" v="149" actId="14100"/>
         <pc:sldMkLst>
           <pc:docMk/>
           <pc:sldMk cId="753115863" sldId="256"/>
         </pc:sldMkLst>
         <pc:spChg chg="mod">
-          <ac:chgData name="Chenarides,Lauren" userId="adbf3f91-28ff-415d-924b-37ef86f41ea6" providerId="ADAL" clId="{A9577445-ED6B-43E6-8E8C-612193906B57}" dt="2025-09-10T23:47:16.202" v="61" actId="1582"/>
+          <ac:chgData name="Chenarides,Lauren" userId="adbf3f91-28ff-415d-924b-37ef86f41ea6" providerId="ADAL" clId="{A9577445-ED6B-43E6-8E8C-612193906B57}" dt="2025-09-15T22:13:17.771" v="149" actId="14100"/>
           <ac:spMkLst>
             <pc:docMk/>
             <pc:sldMk cId="753115863" sldId="256"/>
             <ac:spMk id="5" creationId="{1CDF7CF0-8E8C-81B0-F0A9-8E319C2595A7}"/>
           </ac:spMkLst>
         </pc:spChg>
+      </pc:sldChg>
+      <pc:sldChg chg="modSp add mod">
+        <pc:chgData name="Chenarides,Lauren" userId="adbf3f91-28ff-415d-924b-37ef86f41ea6" providerId="ADAL" clId="{A9577445-ED6B-43E6-8E8C-612193906B57}" dt="2025-09-15T22:14:35.763" v="232"/>
+        <pc:sldMkLst>
+          <pc:docMk/>
+          <pc:sldMk cId="396249511" sldId="257"/>
+        </pc:sldMkLst>
+        <pc:spChg chg="mod">
+          <ac:chgData name="Chenarides,Lauren" userId="adbf3f91-28ff-415d-924b-37ef86f41ea6" providerId="ADAL" clId="{A9577445-ED6B-43E6-8E8C-612193906B57}" dt="2025-09-15T22:14:35.763" v="232"/>
+          <ac:spMkLst>
+            <pc:docMk/>
+            <pc:sldMk cId="396249511" sldId="257"/>
+            <ac:spMk id="5" creationId="{381E5A0A-94CD-1D12-3B9A-EA26D8DBC38F}"/>
+          </ac:spMkLst>
+        </pc:spChg>
+        <pc:picChg chg="mod">
+          <ac:chgData name="Chenarides,Lauren" userId="adbf3f91-28ff-415d-924b-37ef86f41ea6" providerId="ADAL" clId="{A9577445-ED6B-43E6-8E8C-612193906B57}" dt="2025-09-15T22:10:05.522" v="79" actId="14826"/>
+          <ac:picMkLst>
+            <pc:docMk/>
+            <pc:sldMk cId="396249511" sldId="257"/>
+            <ac:picMk id="7" creationId="{3D71685D-87B5-00EE-609F-842B1012A31F}"/>
+          </ac:picMkLst>
+        </pc:picChg>
       </pc:sldChg>
     </pc:docChg>
   </pc:docChgLst>
@@ -291,7 +320,7 @@
           <a:p>
             <a:fld id="{7B23DEEA-D427-4F4C-850F-283492D96A15}" type="datetimeFigureOut">
               <a:rPr lang="en-US" smtClean="0"/>
-              <a:t>9/10/2025</a:t>
+              <a:t>9/15/2025</a:t>
             </a:fld>
             <a:endParaRPr lang="en-US"/>
           </a:p>
@@ -489,7 +518,7 @@
           <a:p>
             <a:fld id="{7B23DEEA-D427-4F4C-850F-283492D96A15}" type="datetimeFigureOut">
               <a:rPr lang="en-US" smtClean="0"/>
-              <a:t>9/10/2025</a:t>
+              <a:t>9/15/2025</a:t>
             </a:fld>
             <a:endParaRPr lang="en-US"/>
           </a:p>
@@ -697,7 +726,7 @@
           <a:p>
             <a:fld id="{7B23DEEA-D427-4F4C-850F-283492D96A15}" type="datetimeFigureOut">
               <a:rPr lang="en-US" smtClean="0"/>
-              <a:t>9/10/2025</a:t>
+              <a:t>9/15/2025</a:t>
             </a:fld>
             <a:endParaRPr lang="en-US"/>
           </a:p>
@@ -895,7 +924,7 @@
           <a:p>
             <a:fld id="{7B23DEEA-D427-4F4C-850F-283492D96A15}" type="datetimeFigureOut">
               <a:rPr lang="en-US" smtClean="0"/>
-              <a:t>9/10/2025</a:t>
+              <a:t>9/15/2025</a:t>
             </a:fld>
             <a:endParaRPr lang="en-US"/>
           </a:p>
@@ -1170,7 +1199,7 @@
           <a:p>
             <a:fld id="{7B23DEEA-D427-4F4C-850F-283492D96A15}" type="datetimeFigureOut">
               <a:rPr lang="en-US" smtClean="0"/>
-              <a:t>9/10/2025</a:t>
+              <a:t>9/15/2025</a:t>
             </a:fld>
             <a:endParaRPr lang="en-US"/>
           </a:p>
@@ -1435,7 +1464,7 @@
           <a:p>
             <a:fld id="{7B23DEEA-D427-4F4C-850F-283492D96A15}" type="datetimeFigureOut">
               <a:rPr lang="en-US" smtClean="0"/>
-              <a:t>9/10/2025</a:t>
+              <a:t>9/15/2025</a:t>
             </a:fld>
             <a:endParaRPr lang="en-US"/>
           </a:p>
@@ -1847,7 +1876,7 @@
           <a:p>
             <a:fld id="{7B23DEEA-D427-4F4C-850F-283492D96A15}" type="datetimeFigureOut">
               <a:rPr lang="en-US" smtClean="0"/>
-              <a:t>9/10/2025</a:t>
+              <a:t>9/15/2025</a:t>
             </a:fld>
             <a:endParaRPr lang="en-US"/>
           </a:p>
@@ -1988,7 +2017,7 @@
           <a:p>
             <a:fld id="{7B23DEEA-D427-4F4C-850F-283492D96A15}" type="datetimeFigureOut">
               <a:rPr lang="en-US" smtClean="0"/>
-              <a:t>9/10/2025</a:t>
+              <a:t>9/15/2025</a:t>
             </a:fld>
             <a:endParaRPr lang="en-US"/>
           </a:p>
@@ -2101,7 +2130,7 @@
           <a:p>
             <a:fld id="{7B23DEEA-D427-4F4C-850F-283492D96A15}" type="datetimeFigureOut">
               <a:rPr lang="en-US" smtClean="0"/>
-              <a:t>9/10/2025</a:t>
+              <a:t>9/15/2025</a:t>
             </a:fld>
             <a:endParaRPr lang="en-US"/>
           </a:p>
@@ -2412,7 +2441,7 @@
           <a:p>
             <a:fld id="{7B23DEEA-D427-4F4C-850F-283492D96A15}" type="datetimeFigureOut">
               <a:rPr lang="en-US" smtClean="0"/>
-              <a:t>9/10/2025</a:t>
+              <a:t>9/15/2025</a:t>
             </a:fld>
             <a:endParaRPr lang="en-US"/>
           </a:p>
@@ -2700,7 +2729,7 @@
           <a:p>
             <a:fld id="{7B23DEEA-D427-4F4C-850F-283492D96A15}" type="datetimeFigureOut">
               <a:rPr lang="en-US" smtClean="0"/>
-              <a:t>9/10/2025</a:t>
+              <a:t>9/15/2025</a:t>
             </a:fld>
             <a:endParaRPr lang="en-US"/>
           </a:p>
@@ -2941,7 +2970,7 @@
           <a:p>
             <a:fld id="{7B23DEEA-D427-4F4C-850F-283492D96A15}" type="datetimeFigureOut">
               <a:rPr lang="en-US" smtClean="0"/>
-              <a:t>9/10/2025</a:t>
+              <a:t>9/15/2025</a:t>
             </a:fld>
             <a:endParaRPr lang="en-US"/>
           </a:p>
@@ -3373,7 +3402,7 @@
         <p:spPr>
           <a:xfrm>
             <a:off x="7626983" y="151179"/>
-            <a:ext cx="4154556" cy="6555641"/>
+            <a:ext cx="4343400" cy="6247864"/>
           </a:xfrm>
           <a:prstGeom prst="rect">
             <a:avLst/>
@@ -3402,7 +3431,7 @@
                   </a:outerShdw>
                 </a:effectLst>
               </a:rPr>
-              <a:t>E-IDP Results</a:t>
+              <a:t>Your E-IDP Results</a:t>
             </a:r>
           </a:p>
           <a:p>
@@ -3420,7 +3449,7 @@
           <a:p>
             <a:r>
               <a:rPr lang="en-US" sz="1600" dirty="0"/>
-              <a:t>Each of the 16 characteristics appears around the outside of the circle, with the distance from the center representing the number of students who chose it. </a:t>
+              <a:t>Each characteristic appears around the outside of the circle, with the distance from the center representing the number of students who chose it. </a:t>
             </a:r>
           </a:p>
           <a:p>
@@ -3443,7 +3472,7 @@
             </a:r>
             <a:r>
               <a:rPr lang="en-US" sz="1600" dirty="0"/>
-              <a:t> was chosen the most (13 students), </a:t>
+              <a:t> (13 students) </a:t>
             </a:r>
           </a:p>
           <a:p>
@@ -3562,6 +3591,269 @@
     <p:extLst>
       <p:ext uri="{BB962C8B-B14F-4D97-AF65-F5344CB8AC3E}">
         <p14:creationId xmlns:p14="http://schemas.microsoft.com/office/powerpoint/2010/main" val="753115863"/>
+      </p:ext>
+    </p:extLst>
+  </p:cSld>
+  <p:clrMapOvr>
+    <a:masterClrMapping/>
+  </p:clrMapOvr>
+</p:sld>
+</file>
+
+<file path=ppt/slides/slide2.xml><?xml version="1.0" encoding="utf-8"?>
+<p:sld xmlns:a="http://schemas.openxmlformats.org/drawingml/2006/main" xmlns:r="http://schemas.openxmlformats.org/officeDocument/2006/relationships" xmlns:p="http://schemas.openxmlformats.org/presentationml/2006/main">
+  <p:cSld>
+    <p:spTree>
+      <p:nvGrpSpPr>
+        <p:cNvPr id="1" name="">
+          <a:extLst>
+            <a:ext uri="{FF2B5EF4-FFF2-40B4-BE49-F238E27FC236}">
+              <a16:creationId xmlns:a16="http://schemas.microsoft.com/office/drawing/2014/main" id="{0F96425D-EBF6-8302-012C-AFA7D2FD1DAF}"/>
+            </a:ext>
+          </a:extLst>
+        </p:cNvPr>
+        <p:cNvGrpSpPr/>
+        <p:nvPr/>
+      </p:nvGrpSpPr>
+      <p:grpSpPr>
+        <a:xfrm>
+          <a:off x="0" y="0"/>
+          <a:ext cx="0" cy="0"/>
+          <a:chOff x="0" y="0"/>
+          <a:chExt cx="0" cy="0"/>
+        </a:xfrm>
+      </p:grpSpPr>
+      <p:sp>
+        <p:nvSpPr>
+          <p:cNvPr id="5" name="TextBox 4">
+            <a:extLst>
+              <a:ext uri="{FF2B5EF4-FFF2-40B4-BE49-F238E27FC236}">
+                <a16:creationId xmlns:a16="http://schemas.microsoft.com/office/drawing/2014/main" id="{381E5A0A-94CD-1D12-3B9A-EA26D8DBC38F}"/>
+              </a:ext>
+            </a:extLst>
+          </p:cNvPr>
+          <p:cNvSpPr txBox="1"/>
+          <p:nvPr/>
+        </p:nvSpPr>
+        <p:spPr>
+          <a:xfrm>
+            <a:off x="7626982" y="151179"/>
+            <a:ext cx="4342595" cy="6370975"/>
+          </a:xfrm>
+          <a:prstGeom prst="rect">
+            <a:avLst/>
+          </a:prstGeom>
+          <a:noFill/>
+          <a:ln w="38100">
+            <a:solidFill>
+              <a:srgbClr val="BECFED"/>
+            </a:solidFill>
+          </a:ln>
+        </p:spPr>
+        <p:txBody>
+          <a:bodyPr wrap="square">
+            <a:spAutoFit/>
+          </a:bodyPr>
+          <a:lstStyle/>
+          <a:p>
+            <a:pPr algn="ctr"/>
+            <a:r>
+              <a:rPr lang="en-US" sz="2000" b="1" dirty="0">
+                <a:effectLst>
+                  <a:outerShdw blurRad="38100" dist="38100" dir="2700000" algn="tl">
+                    <a:srgbClr val="000000">
+                      <a:alpha val="43137"/>
+                    </a:srgbClr>
+                  </a:outerShdw>
+                </a:effectLst>
+              </a:rPr>
+              <a:t>Luke’s E-IDP Results</a:t>
+            </a:r>
+          </a:p>
+          <a:p>
+            <a:endParaRPr lang="en-US" sz="1600" dirty="0"/>
+          </a:p>
+          <a:p>
+            <a:r>
+              <a:rPr lang="en-US" sz="1600" dirty="0"/>
+              <a:t>This radial chart shows how often each entrepreneurial characteristic was selected by students for </a:t>
+            </a:r>
+            <a:r>
+              <a:rPr lang="en-US" sz="1600" b="1" dirty="0">
+                <a:solidFill>
+                  <a:srgbClr val="BECFED"/>
+                </a:solidFill>
+                <a:effectLst>
+                  <a:outerShdw blurRad="38100" dist="38100" dir="2700000" algn="tl">
+                    <a:srgbClr val="000000">
+                      <a:alpha val="43137"/>
+                    </a:srgbClr>
+                  </a:outerShdw>
+                </a:effectLst>
+              </a:rPr>
+              <a:t>Luke Holden of Luke’s Lobsters</a:t>
+            </a:r>
+            <a:r>
+              <a:rPr lang="en-US" sz="1600" dirty="0"/>
+              <a:t>.</a:t>
+            </a:r>
+          </a:p>
+          <a:p>
+            <a:endParaRPr lang="en-US" sz="1600" dirty="0"/>
+          </a:p>
+          <a:p>
+            <a:r>
+              <a:rPr lang="en-US" sz="1600" dirty="0"/>
+              <a:t>Each characteristic* appears around the outside of the circle, with the distance from the center representing the number of students who chose it.</a:t>
+            </a:r>
+          </a:p>
+          <a:p>
+            <a:endParaRPr lang="en-US" sz="1600" dirty="0"/>
+          </a:p>
+          <a:p>
+            <a:r>
+              <a:rPr lang="en-US" sz="1600" dirty="0"/>
+              <a:t>The further out the shape extends, the more common that characteristic was. The top 5 are:</a:t>
+            </a:r>
+          </a:p>
+          <a:p>
+            <a:pPr marL="285750" indent="-285750">
+              <a:buFont typeface="Arial" panose="020B0604020202020204" pitchFamily="34" charset="0"/>
+              <a:buChar char="•"/>
+            </a:pPr>
+            <a:r>
+              <a:rPr lang="en-US" sz="1600" b="1" dirty="0"/>
+              <a:t>Passion</a:t>
+            </a:r>
+            <a:r>
+              <a:rPr lang="en-US" sz="1600" dirty="0"/>
+              <a:t> (20 students)</a:t>
+            </a:r>
+          </a:p>
+          <a:p>
+            <a:pPr marL="285750" indent="-285750">
+              <a:buFont typeface="Arial" panose="020B0604020202020204" pitchFamily="34" charset="0"/>
+              <a:buChar char="•"/>
+            </a:pPr>
+            <a:r>
+              <a:rPr lang="en-US" sz="1600" b="1" dirty="0"/>
+              <a:t>Calculated Risk Taking</a:t>
+            </a:r>
+            <a:r>
+              <a:rPr lang="en-US" sz="1600" dirty="0"/>
+              <a:t> (14)</a:t>
+            </a:r>
+          </a:p>
+          <a:p>
+            <a:pPr marL="285750" indent="-285750">
+              <a:buFont typeface="Arial" panose="020B0604020202020204" pitchFamily="34" charset="0"/>
+              <a:buChar char="•"/>
+            </a:pPr>
+            <a:r>
+              <a:rPr lang="en-US" sz="1600" b="1" dirty="0"/>
+              <a:t>Team Building</a:t>
+            </a:r>
+            <a:r>
+              <a:rPr lang="en-US" sz="1600" dirty="0"/>
+              <a:t> (12)</a:t>
+            </a:r>
+          </a:p>
+          <a:p>
+            <a:pPr marL="285750" indent="-285750">
+              <a:buFont typeface="Arial" panose="020B0604020202020204" pitchFamily="34" charset="0"/>
+              <a:buChar char="•"/>
+            </a:pPr>
+            <a:r>
+              <a:rPr lang="en-US" sz="1600" b="1" dirty="0"/>
+              <a:t>Persistent Problem Solving</a:t>
+            </a:r>
+            <a:r>
+              <a:rPr lang="en-US" sz="1600" dirty="0"/>
+              <a:t> (11)</a:t>
+            </a:r>
+          </a:p>
+          <a:p>
+            <a:pPr marL="285750" indent="-285750">
+              <a:buFont typeface="Arial" panose="020B0604020202020204" pitchFamily="34" charset="0"/>
+              <a:buChar char="•"/>
+            </a:pPr>
+            <a:r>
+              <a:rPr lang="en-US" sz="1600" b="1" dirty="0"/>
+              <a:t>Vision</a:t>
+            </a:r>
+            <a:r>
+              <a:rPr lang="en-US" sz="1600" dirty="0"/>
+              <a:t> (11)</a:t>
+            </a:r>
+          </a:p>
+          <a:p>
+            <a:endParaRPr lang="en-US" sz="1600" dirty="0"/>
+          </a:p>
+          <a:p>
+            <a:r>
+              <a:rPr lang="en-US" sz="1600" dirty="0"/>
+              <a:t>By looking at the overall shape, you can see which traits stood out most strongly across the group and which ones were less common.</a:t>
+            </a:r>
+          </a:p>
+          <a:p>
+            <a:endParaRPr lang="en-US" sz="1600" dirty="0"/>
+          </a:p>
+          <a:p>
+            <a:r>
+              <a:rPr lang="en-US" sz="1200" dirty="0"/>
+              <a:t>N = 37 (out of 48); 77.08%</a:t>
+            </a:r>
+          </a:p>
+          <a:p>
+            <a:endParaRPr lang="en-US" sz="1200" dirty="0"/>
+          </a:p>
+          <a:p>
+            <a:r>
+              <a:rPr lang="en-US" sz="1200" i="1" dirty="0"/>
+              <a:t>*Note: Seeking Feedback was not chosen by any student.</a:t>
+            </a:r>
+          </a:p>
+        </p:txBody>
+      </p:sp>
+      <p:pic>
+        <p:nvPicPr>
+          <p:cNvPr id="7" name="Picture 6">
+            <a:extLst>
+              <a:ext uri="{FF2B5EF4-FFF2-40B4-BE49-F238E27FC236}">
+                <a16:creationId xmlns:a16="http://schemas.microsoft.com/office/drawing/2014/main" id="{3D71685D-87B5-00EE-609F-842B1012A31F}"/>
+              </a:ext>
+            </a:extLst>
+          </p:cNvPr>
+          <p:cNvPicPr>
+            <a:picLocks noChangeAspect="1"/>
+          </p:cNvPicPr>
+          <p:nvPr/>
+        </p:nvPicPr>
+        <p:blipFill>
+          <a:blip r:embed="rId2">
+            <a:extLst>
+              <a:ext uri="{28A0092B-C50C-407E-A947-70E740481C1C}">
+                <a14:useLocalDpi xmlns:a14="http://schemas.microsoft.com/office/drawing/2010/main" val="0"/>
+              </a:ext>
+            </a:extLst>
+          </a:blip>
+          <a:srcRect/>
+          <a:stretch/>
+        </p:blipFill>
+        <p:spPr>
+          <a:xfrm>
+            <a:off x="0" y="198710"/>
+            <a:ext cx="7340814" cy="6460580"/>
+          </a:xfrm>
+          <a:prstGeom prst="rect">
+            <a:avLst/>
+          </a:prstGeom>
+        </p:spPr>
+      </p:pic>
+    </p:spTree>
+    <p:extLst>
+      <p:ext uri="{BB962C8B-B14F-4D97-AF65-F5344CB8AC3E}">
+        <p14:creationId xmlns:p14="http://schemas.microsoft.com/office/powerpoint/2010/main" val="396249511"/>
       </p:ext>
     </p:extLst>
   </p:cSld>

</xml_diff>